<commit_message>
Update facade to support operation wrapping and to fix several bugs.
</commit_message>
<xml_diff>
--- a/extraplugins/diagramtemplate/org.eclipse.papyrus.diagramtemplate.doc/resources/template-diaGen.pptx
+++ b/extraplugins/diagramtemplate/org.eclipse.papyrus.diagramtemplate.doc/resources/template-diaGen.pptx
@@ -1146,13 +1146,13 @@
     </dgm:pt>
   </dgm:ptLst>
   <dgm:cxnLst>
-    <dgm:cxn modelId="{AFC06FFE-A196-427B-840D-1E6674EC539B}" srcId="{D8E6B871-7FEC-4862-922F-FC051BEFDCBF}" destId="{08F5A690-47BE-401E-A965-6A4DBCD01BD7}" srcOrd="1" destOrd="0" parTransId="{E257FC8E-914C-4805-88B0-3A81CE95A7FB}" sibTransId="{0C413484-B561-464E-9963-13B822B56941}"/>
-    <dgm:cxn modelId="{AE09E0C1-D07F-4AFA-BB67-BCB95F0F3E7E}" srcId="{D8E6B871-7FEC-4862-922F-FC051BEFDCBF}" destId="{FB21ABC1-6407-4C24-B65C-02E4C7DFA930}" srcOrd="0" destOrd="0" parTransId="{E7F6B056-2864-4475-8AEB-742C682FFE53}" sibTransId="{D1FE1E4D-D4FB-479E-A2C2-560126DBBEE0}"/>
-    <dgm:cxn modelId="{6E366D5D-466F-46EF-A257-11E118BB37C1}" type="presOf" srcId="{D8E6B871-7FEC-4862-922F-FC051BEFDCBF}" destId="{F0B0E365-517A-4C13-B23A-A1569011ECE2}" srcOrd="0" destOrd="0" presId="urn:microsoft.com/office/officeart/2005/8/layout/chevron1"/>
     <dgm:cxn modelId="{AD8DCBD2-9B5F-443E-9BA2-5557F037F418}" srcId="{D8E6B871-7FEC-4862-922F-FC051BEFDCBF}" destId="{1777444F-F9C0-48D7-B059-96A86FE4C39E}" srcOrd="2" destOrd="0" parTransId="{F9EE322D-6726-4030-9F76-04E9ED900D1E}" sibTransId="{7ECFA793-3024-4C3D-9227-B608FED8F35A}"/>
     <dgm:cxn modelId="{4A04CB89-66A8-45BE-92EC-B058EC9BB6E4}" type="presOf" srcId="{1777444F-F9C0-48D7-B059-96A86FE4C39E}" destId="{0C269385-5A7D-45D5-A05A-33BE8AD28824}" srcOrd="0" destOrd="0" presId="urn:microsoft.com/office/officeart/2005/8/layout/chevron1"/>
+    <dgm:cxn modelId="{E82F4FFA-F454-4BF2-92A5-43AA24921CCC}" type="presOf" srcId="{08F5A690-47BE-401E-A965-6A4DBCD01BD7}" destId="{858EEE2F-CEA4-422A-87DF-D1E5257A456B}" srcOrd="0" destOrd="0" presId="urn:microsoft.com/office/officeart/2005/8/layout/chevron1"/>
+    <dgm:cxn modelId="{AE09E0C1-D07F-4AFA-BB67-BCB95F0F3E7E}" srcId="{D8E6B871-7FEC-4862-922F-FC051BEFDCBF}" destId="{FB21ABC1-6407-4C24-B65C-02E4C7DFA930}" srcOrd="0" destOrd="0" parTransId="{E7F6B056-2864-4475-8AEB-742C682FFE53}" sibTransId="{D1FE1E4D-D4FB-479E-A2C2-560126DBBEE0}"/>
     <dgm:cxn modelId="{461558A2-E546-4594-B3AD-69609C0BD515}" type="presOf" srcId="{FB21ABC1-6407-4C24-B65C-02E4C7DFA930}" destId="{0CAB79DF-044B-4830-82A4-F130335CB2EA}" srcOrd="0" destOrd="0" presId="urn:microsoft.com/office/officeart/2005/8/layout/chevron1"/>
-    <dgm:cxn modelId="{E82F4FFA-F454-4BF2-92A5-43AA24921CCC}" type="presOf" srcId="{08F5A690-47BE-401E-A965-6A4DBCD01BD7}" destId="{858EEE2F-CEA4-422A-87DF-D1E5257A456B}" srcOrd="0" destOrd="0" presId="urn:microsoft.com/office/officeart/2005/8/layout/chevron1"/>
+    <dgm:cxn modelId="{AFC06FFE-A196-427B-840D-1E6674EC539B}" srcId="{D8E6B871-7FEC-4862-922F-FC051BEFDCBF}" destId="{08F5A690-47BE-401E-A965-6A4DBCD01BD7}" srcOrd="1" destOrd="0" parTransId="{E257FC8E-914C-4805-88B0-3A81CE95A7FB}" sibTransId="{0C413484-B561-464E-9963-13B822B56941}"/>
+    <dgm:cxn modelId="{6E366D5D-466F-46EF-A257-11E118BB37C1}" type="presOf" srcId="{D8E6B871-7FEC-4862-922F-FC051BEFDCBF}" destId="{F0B0E365-517A-4C13-B23A-A1569011ECE2}" srcOrd="0" destOrd="0" presId="urn:microsoft.com/office/officeart/2005/8/layout/chevron1"/>
     <dgm:cxn modelId="{C72687C3-2234-4662-8EE1-D9EF74357531}" type="presParOf" srcId="{F0B0E365-517A-4C13-B23A-A1569011ECE2}" destId="{0CAB79DF-044B-4830-82A4-F130335CB2EA}" srcOrd="0" destOrd="0" presId="urn:microsoft.com/office/officeart/2005/8/layout/chevron1"/>
     <dgm:cxn modelId="{C874B623-56B1-43C2-A37D-FEA8ABEA1FDF}" type="presParOf" srcId="{F0B0E365-517A-4C13-B23A-A1569011ECE2}" destId="{8163890D-E77F-4A93-8DFE-6FA2DD95D355}" srcOrd="1" destOrd="0" presId="urn:microsoft.com/office/officeart/2005/8/layout/chevron1"/>
     <dgm:cxn modelId="{E90108AC-F046-435B-B1D3-3427F603EABA}" type="presParOf" srcId="{F0B0E365-517A-4C13-B23A-A1569011ECE2}" destId="{858EEE2F-CEA4-422A-87DF-D1E5257A456B}" srcOrd="2" destOrd="0" presId="urn:microsoft.com/office/officeart/2005/8/layout/chevron1"/>
@@ -1163,14 +1163,14 @@
   <dgm:whole/>
   <dgm:extLst>
     <a:ext uri="http://schemas.microsoft.com/office/drawing/2008/diagram">
-      <dsp:dataModelExt xmlns:dsp="http://schemas.microsoft.com/office/drawing/2008/diagram" xmlns="" relId="rId6" minVer="http://schemas.openxmlformats.org/drawingml/2006/diagram"/>
+      <dsp:dataModelExt xmlns:dsp="http://schemas.microsoft.com/office/drawing/2008/diagram" relId="rId6" minVer="http://schemas.openxmlformats.org/drawingml/2006/diagram"/>
     </a:ext>
   </dgm:extLst>
 </dgm:dataModel>
 </file>
 
 <file path=ppt/diagrams/drawing1.xml><?xml version="1.0" encoding="utf-8"?>
-<dsp:drawing xmlns:dgm="http://schemas.openxmlformats.org/drawingml/2006/diagram" xmlns:a="http://schemas.openxmlformats.org/drawingml/2006/main" xmlns:dsp="http://schemas.microsoft.com/office/drawing/2008/diagram">
+<dsp:drawing xmlns:dgm="http://schemas.openxmlformats.org/drawingml/2006/diagram" xmlns:dsp="http://schemas.microsoft.com/office/drawing/2008/diagram" xmlns:a="http://schemas.openxmlformats.org/drawingml/2006/main">
   <dsp:spTree>
     <dsp:nvGrpSpPr>
       <dsp:cNvPr id="0" name=""/>
@@ -1244,8 +1244,8 @@
         </a:p>
       </dsp:txBody>
       <dsp:txXfrm>
-        <a:off x="2565" y="1615185"/>
-        <a:ext cx="3125943" cy="1250377"/>
+        <a:off x="627754" y="1615185"/>
+        <a:ext cx="1875566" cy="1250377"/>
       </dsp:txXfrm>
     </dsp:sp>
     <dsp:sp modelId="{858EEE2F-CEA4-422A-87DF-D1E5257A456B}">
@@ -1314,8 +1314,8 @@
         </a:p>
       </dsp:txBody>
       <dsp:txXfrm>
-        <a:off x="2815914" y="1615185"/>
-        <a:ext cx="3125943" cy="1250377"/>
+        <a:off x="3441103" y="1615185"/>
+        <a:ext cx="1875566" cy="1250377"/>
       </dsp:txXfrm>
     </dsp:sp>
     <dsp:sp modelId="{0C269385-5A7D-45D5-A05A-33BE8AD28824}">
@@ -1385,8 +1385,8 @@
         </a:p>
       </dsp:txBody>
       <dsp:txXfrm>
-        <a:off x="5629263" y="1615185"/>
-        <a:ext cx="3125943" cy="1250377"/>
+        <a:off x="6254452" y="1615185"/>
+        <a:ext cx="1875566" cy="1250377"/>
       </dsp:txXfrm>
     </dsp:sp>
   </dsp:spTree>
@@ -2927,6 +2927,11 @@
         </p:txBody>
       </p:sp>
     </p:spTree>
+    <p:extLst>
+      <p:ext uri="{BB962C8B-B14F-4D97-AF65-F5344CB8AC3E}">
+        <p14:creationId xmlns:p14="http://schemas.microsoft.com/office/powerpoint/2010/main" val="2485354407"/>
+      </p:ext>
+    </p:extLst>
   </p:cSld>
   <p:clrMap bg1="lt1" tx1="dk1" bg2="lt2" tx2="dk2" accent1="accent1" accent2="accent2" accent3="accent3" accent4="accent4" accent5="accent5" accent6="accent6" hlink="hlink" folHlink="folHlink"/>
 </p:handoutMaster>
@@ -3249,6 +3254,11 @@
         </p:txBody>
       </p:sp>
     </p:spTree>
+    <p:extLst>
+      <p:ext uri="{BB962C8B-B14F-4D97-AF65-F5344CB8AC3E}">
+        <p14:creationId xmlns:p14="http://schemas.microsoft.com/office/powerpoint/2010/main" val="2356288745"/>
+      </p:ext>
+    </p:extLst>
   </p:cSld>
   <p:clrMap bg1="lt1" tx1="dk1" bg2="lt2" tx2="dk2" accent1="accent1" accent2="accent2" accent3="accent3" accent4="accent4" accent5="accent5" accent6="accent6" hlink="hlink" folHlink="folHlink"/>
   <p:notesStyle>
@@ -8724,12 +8734,8 @@
           <a:p>
             <a:pPr eaLnBrk="1" hangingPunct="1"/>
             <a:r>
-              <a:rPr lang="en-US" u="sng" dirty="0" smtClean="0"/>
-              <a:t>Florian </a:t>
-            </a:r>
-            <a:r>
-              <a:rPr lang="en-US" u="sng" dirty="0" err="1" smtClean="0"/>
-              <a:t>Noyrit</a:t>
+              <a:rPr lang="en-US" u="sng" smtClean="0"/>
+              <a:t>CEA LIST</a:t>
             </a:r>
             <a:endParaRPr lang="en-US" u="sng" dirty="0" smtClean="0"/>
           </a:p>
@@ -9750,15 +9756,7 @@
             </a:pPr>
             <a:r>
               <a:rPr lang="en-US" sz="1200" dirty="0" smtClean="0"/>
-              <a:t>3-Select the element you want to </a:t>
-            </a:r>
-            <a:r>
-              <a:rPr lang="en-US" sz="1200" dirty="0" smtClean="0"/>
-              <a:t>create the </a:t>
-            </a:r>
-            <a:r>
-              <a:rPr lang="en-US" sz="1200" dirty="0" smtClean="0"/>
-              <a:t>diagram for. Here, select activity1</a:t>
+              <a:t>3-Select the element you want to create the diagram for. Here, select activity1</a:t>
             </a:r>
             <a:endParaRPr kumimoji="0" lang="en-US" sz="1200" b="0" i="0" u="none" strike="noStrike" cap="none" normalizeH="0" baseline="0" dirty="0" smtClean="0">
               <a:ln>
@@ -11350,30 +11348,14 @@
           <a:p>
             <a:r>
               <a:rPr lang="en-US" dirty="0" smtClean="0"/>
-              <a:t>If the drag and drop feature is not well </a:t>
-            </a:r>
+              <a:t>If the drag and drop feature is not well implemented then the diagram generation will fail</a:t>
+            </a:r>
+          </a:p>
+          <a:p>
+            <a:pPr lvl="1"/>
             <a:r>
               <a:rPr lang="en-US" dirty="0" smtClean="0"/>
-              <a:t>implemented then the </a:t>
-            </a:r>
-            <a:r>
-              <a:rPr lang="en-US" dirty="0" smtClean="0"/>
-              <a:t>diagram generation will fail</a:t>
-            </a:r>
-          </a:p>
-          <a:p>
-            <a:pPr lvl="1"/>
-            <a:r>
-              <a:rPr lang="en-US" dirty="0" smtClean="0"/>
-              <a:t>Post a bug </a:t>
-            </a:r>
-            <a:r>
-              <a:rPr lang="en-US" dirty="0" smtClean="0"/>
-              <a:t>to </a:t>
-            </a:r>
-            <a:r>
-              <a:rPr lang="en-US" dirty="0" smtClean="0"/>
-              <a:t>the developer responsible for the diagram that failed.</a:t>
+              <a:t>Post a bug to the developer responsible for the diagram that failed.</a:t>
             </a:r>
           </a:p>
           <a:p>
@@ -11414,15 +11396,7 @@
           <a:p>
             <a:r>
               <a:rPr lang="en-US" dirty="0" smtClean="0"/>
-              <a:t>Layout of generated diagrams is </a:t>
-            </a:r>
-            <a:r>
-              <a:rPr lang="en-US" dirty="0" smtClean="0"/>
-              <a:t>not always </a:t>
-            </a:r>
-            <a:r>
-              <a:rPr lang="en-US" dirty="0" smtClean="0"/>
-              <a:t>adequate</a:t>
+              <a:t>Layout of generated diagrams is not always adequate</a:t>
             </a:r>
           </a:p>
           <a:p>
@@ -11433,11 +11407,7 @@
             </a:r>
             <a:r>
               <a:rPr lang="en-US" smtClean="0"/>
-              <a:t>with </a:t>
-            </a:r>
-            <a:r>
-              <a:rPr lang="en-US" smtClean="0"/>
-              <a:t>advanced auto </a:t>
+              <a:t>with advanced auto </a:t>
             </a:r>
             <a:r>
               <a:rPr lang="en-US" dirty="0" smtClean="0"/>

</xml_diff>